<commit_message>
Slides from WP4 on the needs for secondary tools
</commit_message>
<xml_diff>
--- a/T7.2/Progress_meeting_20130704/openETCS_Verification_Validation_Strategy_WP4_Tools_130704_02.pptx
+++ b/T7.2/Progress_meeting_20130704/openETCS_Verification_Validation_Strategy_WP4_Tools_130704_02.pptx
@@ -506,7 +506,7 @@
               <a:pPr>
                 <a:defRPr/>
               </a:pPr>
-              <a:t>‹#›</a:t>
+              <a:t>‹N°›</a:t>
             </a:fld>
             <a:endParaRPr lang="de-DE"/>
           </a:p>
@@ -1016,7 +1016,7 @@
               <a:pPr>
                 <a:defRPr/>
               </a:pPr>
-              <a:t>‹#›</a:t>
+              <a:t>‹N°›</a:t>
             </a:fld>
             <a:endParaRPr lang="de-DE"/>
           </a:p>
@@ -4495,7 +4495,7 @@
               <a:pPr>
                 <a:defRPr/>
               </a:pPr>
-              <a:t>‹#›</a:t>
+              <a:t>‹N°›</a:t>
             </a:fld>
             <a:endParaRPr lang="en-US"/>
           </a:p>
@@ -4883,7 +4883,7 @@
               <a:pPr>
                 <a:defRPr/>
               </a:pPr>
-              <a:t>‹#›</a:t>
+              <a:t>‹N°›</a:t>
             </a:fld>
             <a:endParaRPr lang="en-US"/>
           </a:p>
@@ -5057,7 +5057,7 @@
               <a:pPr>
                 <a:defRPr/>
               </a:pPr>
-              <a:t>‹#›</a:t>
+              <a:t>‹N°›</a:t>
             </a:fld>
             <a:endParaRPr lang="de-DE"/>
           </a:p>
@@ -5408,7 +5408,7 @@
               <a:pPr>
                 <a:defRPr/>
               </a:pPr>
-              <a:t>‹#›</a:t>
+              <a:t>‹N°›</a:t>
             </a:fld>
             <a:endParaRPr lang="en-US"/>
           </a:p>
@@ -20990,6 +20990,136 @@
           </a:p>
         </p:txBody>
       </p:sp>
+      <p:sp>
+        <p:nvSpPr>
+          <p:cNvPr id="34" name="Rectangle 33"/>
+          <p:cNvSpPr/>
+          <p:nvPr/>
+        </p:nvSpPr>
+        <p:spPr bwMode="auto">
+          <a:xfrm>
+            <a:off x="7131042" y="1824847"/>
+            <a:ext cx="281140" cy="2373530"/>
+          </a:xfrm>
+          <a:prstGeom prst="rect">
+            <a:avLst/>
+          </a:prstGeom>
+          <a:noFill/>
+          <a:ln w="25400" cap="flat" cmpd="sng" algn="ctr">
+            <a:solidFill>
+              <a:schemeClr val="accent2">
+                <a:lumMod val="60000"/>
+                <a:lumOff val="40000"/>
+              </a:schemeClr>
+            </a:solidFill>
+            <a:prstDash val="solid"/>
+            <a:round/>
+            <a:headEnd type="none" w="med" len="med"/>
+            <a:tailEnd type="none" w="med" len="med"/>
+          </a:ln>
+          <a:effectLst/>
+          <a:extLst>
+            <a:ext uri="{909E8E84-426E-40DD-AFC4-6F175D3DCCD1}">
+              <a14:hiddenFill xmlns:a14="http://schemas.microsoft.com/office/drawing/2010/main">
+                <a:solidFill>
+                  <a:schemeClr val="accent1"/>
+                </a:solidFill>
+              </a14:hiddenFill>
+            </a:ext>
+            <a:ext uri="{AF507438-7753-43E0-B8FC-AC1667EBCBE1}">
+              <a14:hiddenEffects xmlns:a14="http://schemas.microsoft.com/office/drawing/2010/main">
+                <a:effectLst>
+                  <a:outerShdw dist="35921" dir="2700000" algn="ctr" rotWithShape="0">
+                    <a:schemeClr val="bg2"/>
+                  </a:outerShdw>
+                </a:effectLst>
+              </a14:hiddenEffects>
+            </a:ext>
+          </a:extLst>
+        </p:spPr>
+        <p:txBody>
+          <a:bodyPr vert="horz" wrap="square" lIns="91440" tIns="45720" rIns="91440" bIns="45720" numCol="1" rtlCol="0" anchor="t" anchorCtr="0" compatLnSpc="1">
+            <a:prstTxWarp prst="textNoShape">
+              <a:avLst/>
+            </a:prstTxWarp>
+            <a:spAutoFit/>
+          </a:bodyPr>
+          <a:lstStyle/>
+          <a:p>
+            <a:pPr marL="0" marR="0" indent="0" algn="l" defTabSz="914400" rtl="0" eaLnBrk="0" fontAlgn="base" latinLnBrk="0" hangingPunct="0">
+              <a:lnSpc>
+                <a:spcPct val="100000"/>
+              </a:lnSpc>
+              <a:spcBef>
+                <a:spcPct val="50000"/>
+              </a:spcBef>
+              <a:spcAft>
+                <a:spcPct val="0"/>
+              </a:spcAft>
+              <a:buClrTx/>
+              <a:buSzTx/>
+              <a:buFontTx/>
+              <a:buNone/>
+              <a:tabLst/>
+            </a:pPr>
+            <a:endParaRPr kumimoji="0" lang="en-GB" sz="2400" b="1" i="0" u="none" strike="noStrike" cap="none" normalizeH="0" baseline="0" smtClean="0">
+              <a:ln>
+                <a:noFill/>
+              </a:ln>
+              <a:solidFill>
+                <a:srgbClr val="FF0000"/>
+              </a:solidFill>
+              <a:effectLst/>
+              <a:latin typeface="Arial" pitchFamily="34" charset="0"/>
+            </a:endParaRPr>
+          </a:p>
+        </p:txBody>
+      </p:sp>
+      <p:cxnSp>
+        <p:nvCxnSpPr>
+          <p:cNvPr id="35" name="Straight Arrow Connector 27"/>
+          <p:cNvCxnSpPr/>
+          <p:nvPr/>
+        </p:nvCxnSpPr>
+        <p:spPr bwMode="auto">
+          <a:xfrm flipH="1">
+            <a:off x="5118670" y="1931856"/>
+            <a:ext cx="2012372" cy="0"/>
+          </a:xfrm>
+          <a:prstGeom prst="straightConnector1">
+            <a:avLst/>
+          </a:prstGeom>
+          <a:noFill/>
+          <a:ln w="38100" cap="flat" cmpd="sng" algn="ctr">
+            <a:solidFill>
+              <a:srgbClr val="008000"/>
+            </a:solidFill>
+            <a:prstDash val="solid"/>
+            <a:round/>
+            <a:headEnd type="none" w="med" len="med"/>
+            <a:tailEnd type="triangle" w="lg" len="lg"/>
+          </a:ln>
+          <a:effectLst/>
+          <a:extLst>
+            <a:ext uri="{909E8E84-426E-40DD-AFC4-6F175D3DCCD1}">
+              <a14:hiddenFill xmlns:a14="http://schemas.microsoft.com/office/drawing/2010/main">
+                <a:solidFill>
+                  <a:schemeClr val="accent1"/>
+                </a:solidFill>
+              </a14:hiddenFill>
+            </a:ext>
+            <a:ext uri="{AF507438-7753-43E0-B8FC-AC1667EBCBE1}">
+              <a14:hiddenEffects xmlns:a14="http://schemas.microsoft.com/office/drawing/2010/main">
+                <a:effectLst>
+                  <a:outerShdw dist="35921" dir="2700000" algn="ctr" rotWithShape="0">
+                    <a:schemeClr val="bg2"/>
+                  </a:outerShdw>
+                </a:effectLst>
+              </a14:hiddenEffects>
+            </a:ext>
+          </a:extLst>
+        </p:spPr>
+      </p:cxnSp>
     </p:spTree>
     <p:extLst>
       <p:ext uri="{BB962C8B-B14F-4D97-AF65-F5344CB8AC3E}">

</xml_diff>